<commit_message>
more work on formulation and algorithm
</commit_message>
<xml_diff>
--- a/figs/Figures.pptx
+++ b/figs/Figures.pptx
@@ -4069,13 +4069,18 @@
           <a:p>
             <a:pPr algn="ctr"/>
             <a:r>
-              <a:rPr lang="en-US" dirty="0">
+              <a:rPr lang="en-US">
                 <a:solidFill>
                   <a:schemeClr val="tx1"/>
                 </a:solidFill>
               </a:rPr>
-              <a:t>Local Cache:</a:t>
-            </a:r>
+              <a:t>Local Caches:</a:t>
+            </a:r>
+            <a:endParaRPr lang="en-US" dirty="0">
+              <a:solidFill>
+                <a:schemeClr val="tx1"/>
+              </a:solidFill>
+            </a:endParaRPr>
           </a:p>
         </p:txBody>
       </p:sp>
@@ -4127,7 +4132,7 @@
                   <a:schemeClr val="tx1"/>
                 </a:solidFill>
               </a:rPr>
-              <a:t>Local Cache:</a:t>
+              <a:t>Local Caches:</a:t>
             </a:r>
           </a:p>
         </p:txBody>
@@ -4936,7 +4941,7 @@
             <a:solidFill>
               <a:schemeClr val="tx1"/>
             </a:solidFill>
-            <a:tailEnd type="triangle"/>
+            <a:tailEnd type="none"/>
           </a:ln>
         </p:spPr>
         <p:style>
@@ -4974,7 +4979,7 @@
             <a:solidFill>
               <a:schemeClr val="tx1"/>
             </a:solidFill>
-            <a:tailEnd type="triangle"/>
+            <a:tailEnd type="none"/>
           </a:ln>
         </p:spPr>
         <p:style>
@@ -5471,7 +5476,7 @@
             <a:solidFill>
               <a:schemeClr val="tx1"/>
             </a:solidFill>
-            <a:tailEnd type="triangle"/>
+            <a:tailEnd type="none"/>
           </a:ln>
         </p:spPr>
         <p:style>
@@ -5510,7 +5515,7 @@
             <a:solidFill>
               <a:schemeClr val="tx1"/>
             </a:solidFill>
-            <a:tailEnd type="triangle"/>
+            <a:tailEnd type="none"/>
           </a:ln>
         </p:spPr>
         <p:style>
@@ -5622,7 +5627,7 @@
             <a:solidFill>
               <a:schemeClr val="tx1"/>
             </a:solidFill>
-            <a:tailEnd type="triangle"/>
+            <a:tailEnd type="none"/>
           </a:ln>
         </p:spPr>
         <p:style>

</xml_diff>